<commit_message>
Removing Materials from the previous course. Updating new materials.
</commit_message>
<xml_diff>
--- a/02-Computer-Knowledge.pptx
+++ b/02-Computer-Knowledge.pptx
@@ -5,7 +5,7 @@
     <p:sldMasterId id="2147483648" r:id="rId1"/>
   </p:sldMasterIdLst>
   <p:notesMasterIdLst>
-    <p:notesMasterId r:id="rId15"/>
+    <p:notesMasterId r:id="rId14"/>
   </p:notesMasterIdLst>
   <p:sldIdLst>
     <p:sldId id="256" r:id="rId2"/>
@@ -20,7 +20,6 @@
     <p:sldId id="265" r:id="rId11"/>
     <p:sldId id="267" r:id="rId12"/>
     <p:sldId id="268" r:id="rId13"/>
-    <p:sldId id="269" r:id="rId14"/>
   </p:sldIdLst>
   <p:sldSz cx="9144000" cy="6858000" type="screen4x3"/>
   <p:notesSz cx="6858000" cy="9144000"/>
@@ -121,7 +120,7 @@
   </p:defaultTextStyle>
   <p:extLst>
     <p:ext uri="{EFAFB233-063F-42B5-8137-9DF3F51BA10A}">
-      <p15:sldGuideLst xmlns:p15="http://schemas.microsoft.com/office/powerpoint/2012/main" xmlns="">
+      <p15:sldGuideLst xmlns="" xmlns:p15="http://schemas.microsoft.com/office/powerpoint/2012/main">
         <p15:guide id="1" orient="horz" pos="2160">
           <p15:clr>
             <a:srgbClr val="A4A3A4"/>
@@ -220,7 +219,7 @@
           <a:p>
             <a:fld id="{7DD951D0-1F27-4FB6-815E-AD3552092C99}" type="datetimeFigureOut">
               <a:rPr lang="en-US" smtClean="0"/>
-              <a:t>4/26/2015</a:t>
+              <a:t>6/9/2015</a:t>
             </a:fld>
             <a:endParaRPr lang="en-US"/>
           </a:p>
@@ -1688,7 +1687,126 @@
           <a:bodyPr/>
           <a:lstStyle/>
           <a:p>
-            <a:endParaRPr lang="bg-BG" dirty="0"/>
+            <a:pPr marL="0" indent="0" algn="ctr">
+              <a:buNone/>
+            </a:pPr>
+            <a:r>
+              <a:rPr lang="en-US" dirty="0" err="1" smtClean="0">
+                <a:solidFill>
+                  <a:schemeClr val="bg1">
+                    <a:lumMod val="50000"/>
+                  </a:schemeClr>
+                </a:solidFill>
+              </a:rPr>
+              <a:t>Неща</a:t>
+            </a:r>
+            <a:r>
+              <a:rPr lang="en-US" dirty="0" smtClean="0">
+                <a:solidFill>
+                  <a:schemeClr val="bg1">
+                    <a:lumMod val="50000"/>
+                  </a:schemeClr>
+                </a:solidFill>
+              </a:rPr>
+              <a:t>, </a:t>
+            </a:r>
+            <a:r>
+              <a:rPr lang="en-US" dirty="0" err="1" smtClean="0">
+                <a:solidFill>
+                  <a:schemeClr val="bg1">
+                    <a:lumMod val="50000"/>
+                  </a:schemeClr>
+                </a:solidFill>
+              </a:rPr>
+              <a:t>които</a:t>
+            </a:r>
+            <a:r>
+              <a:rPr lang="en-US" dirty="0" smtClean="0">
+                <a:solidFill>
+                  <a:schemeClr val="bg1">
+                    <a:lumMod val="50000"/>
+                  </a:schemeClr>
+                </a:solidFill>
+              </a:rPr>
+              <a:t> </a:t>
+            </a:r>
+            <a:r>
+              <a:rPr lang="en-US" dirty="0" err="1" smtClean="0">
+                <a:solidFill>
+                  <a:schemeClr val="bg1">
+                    <a:lumMod val="50000"/>
+                  </a:schemeClr>
+                </a:solidFill>
+              </a:rPr>
+              <a:t>задължително</a:t>
+            </a:r>
+            <a:r>
+              <a:rPr lang="en-US" dirty="0" smtClean="0">
+                <a:solidFill>
+                  <a:schemeClr val="bg1">
+                    <a:lumMod val="50000"/>
+                  </a:schemeClr>
+                </a:solidFill>
+              </a:rPr>
+              <a:t> </a:t>
+            </a:r>
+            <a:r>
+              <a:rPr lang="en-US" dirty="0" err="1" smtClean="0">
+                <a:solidFill>
+                  <a:schemeClr val="bg1">
+                    <a:lumMod val="50000"/>
+                  </a:schemeClr>
+                </a:solidFill>
+              </a:rPr>
+              <a:t>трябва</a:t>
+            </a:r>
+            <a:r>
+              <a:rPr lang="en-US" dirty="0" smtClean="0">
+                <a:solidFill>
+                  <a:schemeClr val="bg1">
+                    <a:lumMod val="50000"/>
+                  </a:schemeClr>
+                </a:solidFill>
+              </a:rPr>
+              <a:t> </a:t>
+            </a:r>
+            <a:r>
+              <a:rPr lang="en-US" dirty="0" err="1" smtClean="0">
+                <a:solidFill>
+                  <a:schemeClr val="bg1">
+                    <a:lumMod val="50000"/>
+                  </a:schemeClr>
+                </a:solidFill>
+              </a:rPr>
+              <a:t>да</a:t>
+            </a:r>
+            <a:r>
+              <a:rPr lang="en-US" dirty="0" smtClean="0">
+                <a:solidFill>
+                  <a:schemeClr val="bg1">
+                    <a:lumMod val="50000"/>
+                  </a:schemeClr>
+                </a:solidFill>
+              </a:rPr>
+              <a:t> </a:t>
+            </a:r>
+            <a:r>
+              <a:rPr lang="en-US" dirty="0" err="1" smtClean="0">
+                <a:solidFill>
+                  <a:schemeClr val="bg1">
+                    <a:lumMod val="50000"/>
+                  </a:schemeClr>
+                </a:solidFill>
+              </a:rPr>
+              <a:t>знаем</a:t>
+            </a:r>
+            <a:endParaRPr lang="bg-BG" dirty="0">
+              <a:solidFill>
+                <a:schemeClr val="bg1">
+                  <a:lumMod val="50000"/>
+                </a:schemeClr>
+              </a:solidFill>
+            </a:endParaRPr>
           </a:p>
         </p:txBody>
       </p:sp>
@@ -2044,127 +2162,6 @@
       </p:par>
     </p:tnLst>
   </p:timing>
-</p:sld>
-</file>
-
-<file path=ppt/slides/slide13.xml><?xml version="1.0" encoding="utf-8"?>
-<p:sld xmlns:a="http://schemas.openxmlformats.org/drawingml/2006/main" xmlns:r="http://schemas.openxmlformats.org/officeDocument/2006/relationships" xmlns:p="http://schemas.openxmlformats.org/presentationml/2006/main">
-  <p:cSld>
-    <p:spTree>
-      <p:nvGrpSpPr>
-        <p:cNvPr id="1" name=""/>
-        <p:cNvGrpSpPr/>
-        <p:nvPr/>
-      </p:nvGrpSpPr>
-      <p:grpSpPr>
-        <a:xfrm>
-          <a:off x="0" y="0"/>
-          <a:ext cx="0" cy="0"/>
-          <a:chOff x="0" y="0"/>
-          <a:chExt cx="0" cy="0"/>
-        </a:xfrm>
-      </p:grpSpPr>
-      <p:sp>
-        <p:nvSpPr>
-          <p:cNvPr id="2" name="Title 1"/>
-          <p:cNvSpPr>
-            <a:spLocks noGrp="1"/>
-          </p:cNvSpPr>
-          <p:nvPr>
-            <p:ph type="title"/>
-          </p:nvPr>
-        </p:nvSpPr>
-        <p:spPr/>
-        <p:txBody>
-          <a:bodyPr/>
-          <a:lstStyle/>
-          <a:p>
-            <a:pPr algn="l"/>
-            <a:r>
-              <a:rPr lang="bg-BG" dirty="0" smtClean="0"/>
-              <a:t>Домашна работа</a:t>
-            </a:r>
-            <a:endParaRPr lang="en-US" dirty="0"/>
-          </a:p>
-        </p:txBody>
-      </p:sp>
-      <p:sp>
-        <p:nvSpPr>
-          <p:cNvPr id="3" name="Content Placeholder 2"/>
-          <p:cNvSpPr>
-            <a:spLocks noGrp="1"/>
-          </p:cNvSpPr>
-          <p:nvPr>
-            <p:ph idx="1"/>
-          </p:nvPr>
-        </p:nvSpPr>
-        <p:spPr/>
-        <p:txBody>
-          <a:bodyPr/>
-          <a:lstStyle/>
-          <a:p>
-            <a:r>
-              <a:rPr lang="bg-BG" dirty="0" smtClean="0"/>
-              <a:t>Инсталиране на </a:t>
-            </a:r>
-            <a:r>
-              <a:rPr lang="en-US" dirty="0" smtClean="0"/>
-              <a:t>Visual Studio 2013</a:t>
-            </a:r>
-          </a:p>
-          <a:p>
-            <a:pPr lvl="1"/>
-            <a:r>
-              <a:rPr lang="en-US" dirty="0" smtClean="0">
-                <a:solidFill>
-                  <a:schemeClr val="bg1"/>
-                </a:solidFill>
-              </a:rPr>
-              <a:t>Optional features to install (choose only this)</a:t>
-            </a:r>
-          </a:p>
-          <a:p>
-            <a:pPr lvl="2"/>
-            <a:r>
-              <a:rPr lang="en-US" dirty="0" smtClean="0">
-                <a:solidFill>
-                  <a:schemeClr val="bg1"/>
-                </a:solidFill>
-              </a:rPr>
-              <a:t>Microsoft SQL Server Data tools</a:t>
-            </a:r>
-          </a:p>
-          <a:p>
-            <a:pPr lvl="2"/>
-            <a:r>
-              <a:rPr lang="en-US" dirty="0" smtClean="0">
-                <a:solidFill>
-                  <a:schemeClr val="bg1"/>
-                </a:solidFill>
-              </a:rPr>
-              <a:t>Microsoft Web Developer tools</a:t>
-            </a:r>
-          </a:p>
-          <a:p>
-            <a:pPr lvl="2"/>
-            <a:endParaRPr lang="en-US" dirty="0">
-              <a:solidFill>
-                <a:schemeClr val="bg1"/>
-              </a:solidFill>
-            </a:endParaRPr>
-          </a:p>
-        </p:txBody>
-      </p:sp>
-    </p:spTree>
-    <p:extLst>
-      <p:ext uri="{BB962C8B-B14F-4D97-AF65-F5344CB8AC3E}">
-        <p14:creationId xmlns:p14="http://schemas.microsoft.com/office/powerpoint/2010/main" val="2437209025"/>
-      </p:ext>
-    </p:extLst>
-  </p:cSld>
-  <p:clrMapOvr>
-    <a:masterClrMapping/>
-  </p:clrMapOvr>
 </p:sld>
 </file>
 
@@ -3851,7 +3848,7 @@
   <a:extraClrSchemeLst/>
   <a:extLst>
     <a:ext uri="{05A4C25C-085E-4340-85A3-A5531E510DB2}">
-      <thm15:themeFamily xmlns:thm15="http://schemas.microsoft.com/office/thememl/2012/main" xmlns="" name="Office Theme" id="{62F939B6-93AF-4DB8-9C6B-D6C7DFDC589F}" vid="{4A3C46E8-61CC-4603-A589-7422A47A8E4A}"/>
+      <thm15:themeFamily xmlns="" xmlns:thm15="http://schemas.microsoft.com/office/thememl/2012/main" name="Office Theme" id="{62F939B6-93AF-4DB8-9C6B-D6C7DFDC589F}" vid="{4A3C46E8-61CC-4603-A589-7422A47A8E4A}"/>
     </a:ext>
   </a:extLst>
 </a:theme>

</xml_diff>